<commit_message>
refactor good page and add keyboard actions
</commit_message>
<xml_diff>
--- a/Презентация Быченков А.К. ИКБО-32-21.pptx
+++ b/Презентация Быченков А.К. ИКБО-32-21.pptx
@@ -126,6 +126,9 @@
         </p14:section>
       </p14:sectionLst>
     </p:ext>
+    <p:ext uri="{EFAFB233-063F-42B5-8137-9DF3F51BA10A}">
+      <p15:sldGuideLst xmlns:p15="http://schemas.microsoft.com/office/powerpoint/2012/main"/>
+    </p:ext>
   </p:extLst>
 </p:presentation>
 </file>
@@ -277,7 +280,7 @@
           <a:p>
             <a:fld id="{2A366725-3AD4-4D8F-9350-9CF3FCCD27D8}" type="datetimeFigureOut">
               <a:rPr lang="ru-RU" smtClean="0"/>
-              <a:t>27.12.2022</a:t>
+              <a:t>28.12.2022</a:t>
             </a:fld>
             <a:endParaRPr lang="ru-RU"/>
           </a:p>
@@ -475,7 +478,7 @@
           <a:p>
             <a:fld id="{2A366725-3AD4-4D8F-9350-9CF3FCCD27D8}" type="datetimeFigureOut">
               <a:rPr lang="ru-RU" smtClean="0"/>
-              <a:t>27.12.2022</a:t>
+              <a:t>28.12.2022</a:t>
             </a:fld>
             <a:endParaRPr lang="ru-RU"/>
           </a:p>
@@ -683,7 +686,7 @@
           <a:p>
             <a:fld id="{2A366725-3AD4-4D8F-9350-9CF3FCCD27D8}" type="datetimeFigureOut">
               <a:rPr lang="ru-RU" smtClean="0"/>
-              <a:t>27.12.2022</a:t>
+              <a:t>28.12.2022</a:t>
             </a:fld>
             <a:endParaRPr lang="ru-RU"/>
           </a:p>
@@ -881,7 +884,7 @@
           <a:p>
             <a:fld id="{2A366725-3AD4-4D8F-9350-9CF3FCCD27D8}" type="datetimeFigureOut">
               <a:rPr lang="ru-RU" smtClean="0"/>
-              <a:t>27.12.2022</a:t>
+              <a:t>28.12.2022</a:t>
             </a:fld>
             <a:endParaRPr lang="ru-RU"/>
           </a:p>
@@ -1156,7 +1159,7 @@
           <a:p>
             <a:fld id="{2A366725-3AD4-4D8F-9350-9CF3FCCD27D8}" type="datetimeFigureOut">
               <a:rPr lang="ru-RU" smtClean="0"/>
-              <a:t>27.12.2022</a:t>
+              <a:t>28.12.2022</a:t>
             </a:fld>
             <a:endParaRPr lang="ru-RU"/>
           </a:p>
@@ -1421,7 +1424,7 @@
           <a:p>
             <a:fld id="{2A366725-3AD4-4D8F-9350-9CF3FCCD27D8}" type="datetimeFigureOut">
               <a:rPr lang="ru-RU" smtClean="0"/>
-              <a:t>27.12.2022</a:t>
+              <a:t>28.12.2022</a:t>
             </a:fld>
             <a:endParaRPr lang="ru-RU"/>
           </a:p>
@@ -1833,7 +1836,7 @@
           <a:p>
             <a:fld id="{2A366725-3AD4-4D8F-9350-9CF3FCCD27D8}" type="datetimeFigureOut">
               <a:rPr lang="ru-RU" smtClean="0"/>
-              <a:t>27.12.2022</a:t>
+              <a:t>28.12.2022</a:t>
             </a:fld>
             <a:endParaRPr lang="ru-RU"/>
           </a:p>
@@ -1974,7 +1977,7 @@
           <a:p>
             <a:fld id="{2A366725-3AD4-4D8F-9350-9CF3FCCD27D8}" type="datetimeFigureOut">
               <a:rPr lang="ru-RU" smtClean="0"/>
-              <a:t>27.12.2022</a:t>
+              <a:t>28.12.2022</a:t>
             </a:fld>
             <a:endParaRPr lang="ru-RU"/>
           </a:p>
@@ -2087,7 +2090,7 @@
           <a:p>
             <a:fld id="{2A366725-3AD4-4D8F-9350-9CF3FCCD27D8}" type="datetimeFigureOut">
               <a:rPr lang="ru-RU" smtClean="0"/>
-              <a:t>27.12.2022</a:t>
+              <a:t>28.12.2022</a:t>
             </a:fld>
             <a:endParaRPr lang="ru-RU"/>
           </a:p>
@@ -2398,7 +2401,7 @@
           <a:p>
             <a:fld id="{2A366725-3AD4-4D8F-9350-9CF3FCCD27D8}" type="datetimeFigureOut">
               <a:rPr lang="ru-RU" smtClean="0"/>
-              <a:t>27.12.2022</a:t>
+              <a:t>28.12.2022</a:t>
             </a:fld>
             <a:endParaRPr lang="ru-RU"/>
           </a:p>
@@ -2686,7 +2689,7 @@
           <a:p>
             <a:fld id="{2A366725-3AD4-4D8F-9350-9CF3FCCD27D8}" type="datetimeFigureOut">
               <a:rPr lang="ru-RU" smtClean="0"/>
-              <a:t>27.12.2022</a:t>
+              <a:t>28.12.2022</a:t>
             </a:fld>
             <a:endParaRPr lang="ru-RU"/>
           </a:p>
@@ -2927,7 +2930,7 @@
           <a:p>
             <a:fld id="{2A366725-3AD4-4D8F-9350-9CF3FCCD27D8}" type="datetimeFigureOut">
               <a:rPr lang="ru-RU" smtClean="0"/>
-              <a:t>27.12.2022</a:t>
+              <a:t>28.12.2022</a:t>
             </a:fld>
             <a:endParaRPr lang="ru-RU"/>
           </a:p>

</xml_diff>